<commit_message>
Took out instruction slide at beginning of executive presentation
</commit_message>
<xml_diff>
--- a/Executive_Presentation_Big_Mountain.pptx
+++ b/Executive_Presentation_Big_Mountain.pptx
@@ -5,20 +5,19 @@
     <p:sldMasterId id="2147483648" r:id="rId1"/>
   </p:sldMasterIdLst>
   <p:notesMasterIdLst>
-    <p:notesMasterId r:id="rId13"/>
+    <p:notesMasterId r:id="rId12"/>
   </p:notesMasterIdLst>
   <p:sldIdLst>
-    <p:sldId id="257" r:id="rId2"/>
-    <p:sldId id="256" r:id="rId3"/>
-    <p:sldId id="261" r:id="rId4"/>
-    <p:sldId id="265" r:id="rId5"/>
-    <p:sldId id="266" r:id="rId6"/>
-    <p:sldId id="259" r:id="rId7"/>
-    <p:sldId id="267" r:id="rId8"/>
-    <p:sldId id="260" r:id="rId9"/>
-    <p:sldId id="263" r:id="rId10"/>
-    <p:sldId id="268" r:id="rId11"/>
-    <p:sldId id="264" r:id="rId12"/>
+    <p:sldId id="256" r:id="rId2"/>
+    <p:sldId id="261" r:id="rId3"/>
+    <p:sldId id="265" r:id="rId4"/>
+    <p:sldId id="266" r:id="rId5"/>
+    <p:sldId id="259" r:id="rId6"/>
+    <p:sldId id="267" r:id="rId7"/>
+    <p:sldId id="260" r:id="rId8"/>
+    <p:sldId id="263" r:id="rId9"/>
+    <p:sldId id="268" r:id="rId10"/>
+    <p:sldId id="264" r:id="rId11"/>
   </p:sldIdLst>
   <p:sldSz cx="12192000" cy="6858000"/>
   <p:notesSz cx="6858000" cy="9144000"/>
@@ -117,6 +116,11 @@
       </a:defRPr>
     </a:lvl9pPr>
   </p:defaultTextStyle>
+  <p:extLst>
+    <p:ext uri="{EFAFB233-063F-42B5-8137-9DF3F51BA10A}">
+      <p15:sldGuideLst xmlns:p15="http://schemas.microsoft.com/office/powerpoint/2012/main"/>
+    </p:ext>
+  </p:extLst>
 </p:presentation>
 </file>
 
@@ -202,7 +206,7 @@
           <a:p>
             <a:fld id="{7637F712-2BEC-BE4E-B285-A6C15E3F39F6}" type="datetimeFigureOut">
               <a:rPr lang="en-US" smtClean="0"/>
-              <a:t>8/14/25</a:t>
+              <a:t>8/15/25</a:t>
             </a:fld>
             <a:endParaRPr lang="en-US"/>
           </a:p>
@@ -534,7 +538,7 @@
           <a:p>
             <a:fld id="{D27C3D3E-405E-2D4F-AEA7-C4FF6E3A400F}" type="slidenum">
               <a:rPr lang="en-US" smtClean="0"/>
-              <a:t>2</a:t>
+              <a:t>1</a:t>
             </a:fld>
             <a:endParaRPr lang="en-US"/>
           </a:p>
@@ -618,7 +622,7 @@
           <a:p>
             <a:fld id="{D27C3D3E-405E-2D4F-AEA7-C4FF6E3A400F}" type="slidenum">
               <a:rPr lang="en-US" smtClean="0"/>
-              <a:t>11</a:t>
+              <a:t>10</a:t>
             </a:fld>
             <a:endParaRPr lang="en-US"/>
           </a:p>
@@ -702,7 +706,7 @@
           <a:p>
             <a:fld id="{D27C3D3E-405E-2D4F-AEA7-C4FF6E3A400F}" type="slidenum">
               <a:rPr lang="en-US" smtClean="0"/>
-              <a:t>3</a:t>
+              <a:t>2</a:t>
             </a:fld>
             <a:endParaRPr lang="en-US"/>
           </a:p>
@@ -786,7 +790,7 @@
           <a:p>
             <a:fld id="{D27C3D3E-405E-2D4F-AEA7-C4FF6E3A400F}" type="slidenum">
               <a:rPr lang="en-US" smtClean="0"/>
-              <a:t>4</a:t>
+              <a:t>3</a:t>
             </a:fld>
             <a:endParaRPr lang="en-US"/>
           </a:p>
@@ -870,7 +874,7 @@
           <a:p>
             <a:fld id="{D27C3D3E-405E-2D4F-AEA7-C4FF6E3A400F}" type="slidenum">
               <a:rPr lang="en-US" smtClean="0"/>
-              <a:t>5</a:t>
+              <a:t>4</a:t>
             </a:fld>
             <a:endParaRPr lang="en-US"/>
           </a:p>
@@ -954,7 +958,7 @@
           <a:p>
             <a:fld id="{D27C3D3E-405E-2D4F-AEA7-C4FF6E3A400F}" type="slidenum">
               <a:rPr lang="en-US" smtClean="0"/>
-              <a:t>6</a:t>
+              <a:t>5</a:t>
             </a:fld>
             <a:endParaRPr lang="en-US"/>
           </a:p>
@@ -1038,7 +1042,7 @@
           <a:p>
             <a:fld id="{D27C3D3E-405E-2D4F-AEA7-C4FF6E3A400F}" type="slidenum">
               <a:rPr lang="en-US" smtClean="0"/>
-              <a:t>7</a:t>
+              <a:t>6</a:t>
             </a:fld>
             <a:endParaRPr lang="en-US"/>
           </a:p>
@@ -1122,7 +1126,7 @@
           <a:p>
             <a:fld id="{D27C3D3E-405E-2D4F-AEA7-C4FF6E3A400F}" type="slidenum">
               <a:rPr lang="en-US" smtClean="0"/>
-              <a:t>8</a:t>
+              <a:t>7</a:t>
             </a:fld>
             <a:endParaRPr lang="en-US"/>
           </a:p>
@@ -1206,7 +1210,7 @@
           <a:p>
             <a:fld id="{D27C3D3E-405E-2D4F-AEA7-C4FF6E3A400F}" type="slidenum">
               <a:rPr lang="en-US" smtClean="0"/>
-              <a:t>9</a:t>
+              <a:t>8</a:t>
             </a:fld>
             <a:endParaRPr lang="en-US"/>
           </a:p>
@@ -1290,7 +1294,7 @@
           <a:p>
             <a:fld id="{D27C3D3E-405E-2D4F-AEA7-C4FF6E3A400F}" type="slidenum">
               <a:rPr lang="en-US" smtClean="0"/>
-              <a:t>10</a:t>
+              <a:t>9</a:t>
             </a:fld>
             <a:endParaRPr lang="en-US"/>
           </a:p>
@@ -1456,7 +1460,7 @@
           <a:p>
             <a:fld id="{5C0419B6-A18C-E140-879F-9F405C4D57A2}" type="datetimeFigureOut">
               <a:rPr lang="en-US" smtClean="0"/>
-              <a:t>8/14/25</a:t>
+              <a:t>8/15/25</a:t>
             </a:fld>
             <a:endParaRPr lang="en-US"/>
           </a:p>
@@ -1654,7 +1658,7 @@
           <a:p>
             <a:fld id="{5C0419B6-A18C-E140-879F-9F405C4D57A2}" type="datetimeFigureOut">
               <a:rPr lang="en-US" smtClean="0"/>
-              <a:t>8/14/25</a:t>
+              <a:t>8/15/25</a:t>
             </a:fld>
             <a:endParaRPr lang="en-US"/>
           </a:p>
@@ -1862,7 +1866,7 @@
           <a:p>
             <a:fld id="{5C0419B6-A18C-E140-879F-9F405C4D57A2}" type="datetimeFigureOut">
               <a:rPr lang="en-US" smtClean="0"/>
-              <a:t>8/14/25</a:t>
+              <a:t>8/15/25</a:t>
             </a:fld>
             <a:endParaRPr lang="en-US"/>
           </a:p>
@@ -2060,7 +2064,7 @@
           <a:p>
             <a:fld id="{5C0419B6-A18C-E140-879F-9F405C4D57A2}" type="datetimeFigureOut">
               <a:rPr lang="en-US" smtClean="0"/>
-              <a:t>8/14/25</a:t>
+              <a:t>8/15/25</a:t>
             </a:fld>
             <a:endParaRPr lang="en-US"/>
           </a:p>
@@ -2335,7 +2339,7 @@
           <a:p>
             <a:fld id="{5C0419B6-A18C-E140-879F-9F405C4D57A2}" type="datetimeFigureOut">
               <a:rPr lang="en-US" smtClean="0"/>
-              <a:t>8/14/25</a:t>
+              <a:t>8/15/25</a:t>
             </a:fld>
             <a:endParaRPr lang="en-US"/>
           </a:p>
@@ -2600,7 +2604,7 @@
           <a:p>
             <a:fld id="{5C0419B6-A18C-E140-879F-9F405C4D57A2}" type="datetimeFigureOut">
               <a:rPr lang="en-US" smtClean="0"/>
-              <a:t>8/14/25</a:t>
+              <a:t>8/15/25</a:t>
             </a:fld>
             <a:endParaRPr lang="en-US"/>
           </a:p>
@@ -3012,7 +3016,7 @@
           <a:p>
             <a:fld id="{5C0419B6-A18C-E140-879F-9F405C4D57A2}" type="datetimeFigureOut">
               <a:rPr lang="en-US" smtClean="0"/>
-              <a:t>8/14/25</a:t>
+              <a:t>8/15/25</a:t>
             </a:fld>
             <a:endParaRPr lang="en-US"/>
           </a:p>
@@ -3153,7 +3157,7 @@
           <a:p>
             <a:fld id="{5C0419B6-A18C-E140-879F-9F405C4D57A2}" type="datetimeFigureOut">
               <a:rPr lang="en-US" smtClean="0"/>
-              <a:t>8/14/25</a:t>
+              <a:t>8/15/25</a:t>
             </a:fld>
             <a:endParaRPr lang="en-US"/>
           </a:p>
@@ -3266,7 +3270,7 @@
           <a:p>
             <a:fld id="{5C0419B6-A18C-E140-879F-9F405C4D57A2}" type="datetimeFigureOut">
               <a:rPr lang="en-US" smtClean="0"/>
-              <a:t>8/14/25</a:t>
+              <a:t>8/15/25</a:t>
             </a:fld>
             <a:endParaRPr lang="en-US"/>
           </a:p>
@@ -3577,7 +3581,7 @@
           <a:p>
             <a:fld id="{5C0419B6-A18C-E140-879F-9F405C4D57A2}" type="datetimeFigureOut">
               <a:rPr lang="en-US" smtClean="0"/>
-              <a:t>8/14/25</a:t>
+              <a:t>8/15/25</a:t>
             </a:fld>
             <a:endParaRPr lang="en-US"/>
           </a:p>
@@ -3865,7 +3869,7 @@
           <a:p>
             <a:fld id="{5C0419B6-A18C-E140-879F-9F405C4D57A2}" type="datetimeFigureOut">
               <a:rPr lang="en-US" smtClean="0"/>
-              <a:t>8/14/25</a:t>
+              <a:t>8/15/25</a:t>
             </a:fld>
             <a:endParaRPr lang="en-US"/>
           </a:p>
@@ -4106,7 +4110,7 @@
           <a:p>
             <a:fld id="{5C0419B6-A18C-E140-879F-9F405C4D57A2}" type="datetimeFigureOut">
               <a:rPr lang="en-US" smtClean="0"/>
-              <a:t>8/14/25</a:t>
+              <a:t>8/15/25</a:t>
             </a:fld>
             <a:endParaRPr lang="en-US"/>
           </a:p>
@@ -4509,913 +4513,6 @@
 <file path=ppt/slides/slide1.xml><?xml version="1.0" encoding="utf-8"?>
 <p:sld xmlns:a="http://schemas.openxmlformats.org/drawingml/2006/main" xmlns:r="http://schemas.openxmlformats.org/officeDocument/2006/relationships" xmlns:p="http://schemas.openxmlformats.org/presentationml/2006/main">
   <p:cSld>
-    <p:spTree>
-      <p:nvGrpSpPr>
-        <p:cNvPr id="1" name=""/>
-        <p:cNvGrpSpPr/>
-        <p:nvPr/>
-      </p:nvGrpSpPr>
-      <p:grpSpPr>
-        <a:xfrm>
-          <a:off x="0" y="0"/>
-          <a:ext cx="0" cy="0"/>
-          <a:chOff x="0" y="0"/>
-          <a:chExt cx="0" cy="0"/>
-        </a:xfrm>
-      </p:grpSpPr>
-      <p:sp>
-        <p:nvSpPr>
-          <p:cNvPr id="2" name="Title 1">
-            <a:extLst>
-              <a:ext uri="{FF2B5EF4-FFF2-40B4-BE49-F238E27FC236}">
-                <a16:creationId xmlns:a16="http://schemas.microsoft.com/office/drawing/2014/main" id="{BB53CC2D-608C-5215-819F-B4F00A6A3EA5}"/>
-              </a:ext>
-            </a:extLst>
-          </p:cNvPr>
-          <p:cNvSpPr>
-            <a:spLocks noGrp="1"/>
-          </p:cNvSpPr>
-          <p:nvPr>
-            <p:ph type="title"/>
-          </p:nvPr>
-        </p:nvSpPr>
-        <p:spPr/>
-        <p:txBody>
-          <a:bodyPr/>
-          <a:lstStyle/>
-          <a:p>
-            <a:r>
-              <a:rPr lang="en-US" dirty="0"/>
-              <a:t>Instructions</a:t>
-            </a:r>
-          </a:p>
-        </p:txBody>
-      </p:sp>
-      <p:sp>
-        <p:nvSpPr>
-          <p:cNvPr id="3" name="Content Placeholder 2">
-            <a:extLst>
-              <a:ext uri="{FF2B5EF4-FFF2-40B4-BE49-F238E27FC236}">
-                <a16:creationId xmlns:a16="http://schemas.microsoft.com/office/drawing/2014/main" id="{DFC7677F-636A-47AA-A19E-E32D0595CF2C}"/>
-              </a:ext>
-            </a:extLst>
-          </p:cNvPr>
-          <p:cNvSpPr>
-            <a:spLocks noGrp="1"/>
-          </p:cNvSpPr>
-          <p:nvPr>
-            <p:ph idx="1"/>
-          </p:nvPr>
-        </p:nvSpPr>
-        <p:spPr/>
-        <p:txBody>
-          <a:bodyPr>
-            <a:normAutofit fontScale="92500" lnSpcReduction="20000"/>
-          </a:bodyPr>
-          <a:lstStyle/>
-          <a:p>
-            <a:r>
-              <a:rPr lang="en-US" dirty="0"/>
-              <a:t>For an executive presentation, start with the problem identification and your recommendation before moving into how you arrived at that recommendation. Here is how we recommend you structure your slide deck: </a:t>
-            </a:r>
-          </a:p>
-          <a:p>
-            <a:r>
-              <a:rPr lang="en-US" dirty="0"/>
-              <a:t>Problem identification (1-2 slides)</a:t>
-            </a:r>
-          </a:p>
-          <a:p>
-            <a:r>
-              <a:rPr lang="en-US" dirty="0"/>
-              <a:t>Recommendation and key findings (1 slide)</a:t>
-            </a:r>
-          </a:p>
-          <a:p>
-            <a:r>
-              <a:rPr lang="en-US" dirty="0"/>
-              <a:t>Modeling results and analysis (3-4 slides)</a:t>
-            </a:r>
-          </a:p>
-          <a:p>
-            <a:r>
-              <a:rPr lang="en-US" dirty="0"/>
-              <a:t>Summary and conclusion (1 slide) </a:t>
-            </a:r>
-          </a:p>
-          <a:p>
-            <a:r>
-              <a:rPr lang="en-US" dirty="0"/>
-              <a:t>Make sure that your slide deck's share settings allow anyone with the link to view your slide deck. </a:t>
-            </a:r>
-            <a:r>
-              <a:rPr lang="en-US" b="1" dirty="0"/>
-              <a:t>When you are finished, please push your slide deck to GitHub.</a:t>
-            </a:r>
-            <a:r>
-              <a:rPr lang="en-US" dirty="0"/>
-              <a:t> Please submit a link to the location of your slide deck in your repository.</a:t>
-            </a:r>
-          </a:p>
-          <a:p>
-            <a:endParaRPr lang="en-US" dirty="0"/>
-          </a:p>
-        </p:txBody>
-      </p:sp>
-    </p:spTree>
-    <p:extLst>
-      <p:ext uri="{BB962C8B-B14F-4D97-AF65-F5344CB8AC3E}">
-        <p14:creationId xmlns:p14="http://schemas.microsoft.com/office/powerpoint/2010/main" val="2701870892"/>
-      </p:ext>
-    </p:extLst>
-  </p:cSld>
-  <p:clrMapOvr>
-    <a:masterClrMapping/>
-  </p:clrMapOvr>
-</p:sld>
-</file>
-
-<file path=ppt/slides/slide10.xml><?xml version="1.0" encoding="utf-8"?>
-<p:sld xmlns:a="http://schemas.openxmlformats.org/drawingml/2006/main" xmlns:r="http://schemas.openxmlformats.org/officeDocument/2006/relationships" xmlns:p="http://schemas.openxmlformats.org/presentationml/2006/main">
-  <p:cSld>
-    <p:bg>
-      <p:bgPr>
-        <a:solidFill>
-          <a:schemeClr val="bg1"/>
-        </a:solidFill>
-        <a:effectLst/>
-      </p:bgPr>
-    </p:bg>
-    <p:spTree>
-      <p:nvGrpSpPr>
-        <p:cNvPr id="1" name=""/>
-        <p:cNvGrpSpPr/>
-        <p:nvPr/>
-      </p:nvGrpSpPr>
-      <p:grpSpPr>
-        <a:xfrm>
-          <a:off x="0" y="0"/>
-          <a:ext cx="0" cy="0"/>
-          <a:chOff x="0" y="0"/>
-          <a:chExt cx="0" cy="0"/>
-        </a:xfrm>
-      </p:grpSpPr>
-      <p:sp useBgFill="1">
-        <p:nvSpPr>
-          <p:cNvPr id="8" name="Rectangle 7">
-            <a:extLst>
-              <a:ext uri="{FF2B5EF4-FFF2-40B4-BE49-F238E27FC236}">
-                <a16:creationId xmlns:a16="http://schemas.microsoft.com/office/drawing/2014/main" id="{CBB2B1F0-0DD6-4744-9A46-7A344FB48E40}"/>
-              </a:ext>
-              <a:ext uri="{C183D7F6-B498-43B3-948B-1728B52AA6E4}">
-                <adec:decorative xmlns:adec="http://schemas.microsoft.com/office/drawing/2017/decorative" val="1"/>
-              </a:ext>
-            </a:extLst>
-          </p:cNvPr>
-          <p:cNvSpPr>
-            <a:spLocks noGrp="1" noRot="1" noChangeAspect="1" noMove="1" noResize="1" noEditPoints="1" noAdjustHandles="1" noChangeArrowheads="1" noChangeShapeType="1" noTextEdit="1"/>
-          </p:cNvSpPr>
-          <p:nvPr>
-            <p:extLst>
-              <p:ext uri="{386F3935-93C4-4BCD-93E2-E3B085C9AB24}">
-                <p16:designElem xmlns:p16="http://schemas.microsoft.com/office/powerpoint/2015/main" val="1"/>
-              </p:ext>
-            </p:extLst>
-          </p:nvPr>
-        </p:nvSpPr>
-        <p:spPr>
-          <a:xfrm>
-            <a:off x="0" y="0"/>
-            <a:ext cx="12192000" cy="6858000"/>
-          </a:xfrm>
-          <a:prstGeom prst="rect">
-            <a:avLst/>
-          </a:prstGeom>
-          <a:ln>
-            <a:noFill/>
-          </a:ln>
-        </p:spPr>
-        <p:style>
-          <a:lnRef idx="2">
-            <a:schemeClr val="accent1">
-              <a:shade val="50000"/>
-            </a:schemeClr>
-          </a:lnRef>
-          <a:fillRef idx="1">
-            <a:schemeClr val="accent1"/>
-          </a:fillRef>
-          <a:effectRef idx="0">
-            <a:schemeClr val="accent1"/>
-          </a:effectRef>
-          <a:fontRef idx="minor">
-            <a:schemeClr val="lt1"/>
-          </a:fontRef>
-        </p:style>
-        <p:txBody>
-          <a:bodyPr rtlCol="0" anchor="ctr"/>
-          <a:lstStyle/>
-          <a:p>
-            <a:pPr algn="ctr"/>
-            <a:endParaRPr lang="en-US"/>
-          </a:p>
-        </p:txBody>
-      </p:sp>
-      <p:sp>
-        <p:nvSpPr>
-          <p:cNvPr id="2" name="Title 1">
-            <a:extLst>
-              <a:ext uri="{FF2B5EF4-FFF2-40B4-BE49-F238E27FC236}">
-                <a16:creationId xmlns:a16="http://schemas.microsoft.com/office/drawing/2014/main" id="{6B69D532-3C23-B60D-9293-4D73396CC424}"/>
-              </a:ext>
-            </a:extLst>
-          </p:cNvPr>
-          <p:cNvSpPr>
-            <a:spLocks noGrp="1"/>
-          </p:cNvSpPr>
-          <p:nvPr>
-            <p:ph type="title"/>
-          </p:nvPr>
-        </p:nvSpPr>
-        <p:spPr>
-          <a:xfrm>
-            <a:off x="841248" y="426720"/>
-            <a:ext cx="10506456" cy="1919141"/>
-          </a:xfrm>
-        </p:spPr>
-        <p:txBody>
-          <a:bodyPr anchor="b">
-            <a:normAutofit/>
-          </a:bodyPr>
-          <a:lstStyle/>
-          <a:p>
-            <a:r>
-              <a:rPr lang="en-US" sz="6000"/>
-              <a:t>Facility Investment Scenarios</a:t>
-            </a:r>
-          </a:p>
-        </p:txBody>
-      </p:sp>
-      <p:sp>
-        <p:nvSpPr>
-          <p:cNvPr id="10" name="Rectangle 9">
-            <a:extLst>
-              <a:ext uri="{FF2B5EF4-FFF2-40B4-BE49-F238E27FC236}">
-                <a16:creationId xmlns:a16="http://schemas.microsoft.com/office/drawing/2014/main" id="{52D502E5-F6B4-4D58-B4AE-FC466FF15EE8}"/>
-              </a:ext>
-              <a:ext uri="{C183D7F6-B498-43B3-948B-1728B52AA6E4}">
-                <adec:decorative xmlns:adec="http://schemas.microsoft.com/office/drawing/2017/decorative" val="1"/>
-              </a:ext>
-            </a:extLst>
-          </p:cNvPr>
-          <p:cNvSpPr>
-            <a:spLocks noGrp="1" noRot="1" noChangeAspect="1" noMove="1" noResize="1" noEditPoints="1" noAdjustHandles="1" noChangeArrowheads="1" noChangeShapeType="1" noTextEdit="1"/>
-          </p:cNvSpPr>
-          <p:nvPr>
-            <p:extLst>
-              <p:ext uri="{386F3935-93C4-4BCD-93E2-E3B085C9AB24}">
-                <p16:designElem xmlns:p16="http://schemas.microsoft.com/office/powerpoint/2015/main" val="1"/>
-              </p:ext>
-            </p:extLst>
-          </p:nvPr>
-        </p:nvSpPr>
-        <p:spPr>
-          <a:xfrm>
-            <a:off x="865953" y="2899927"/>
-            <a:ext cx="10451592" cy="18288"/>
-          </a:xfrm>
-          <a:prstGeom prst="rect">
-            <a:avLst/>
-          </a:prstGeom>
-          <a:solidFill>
-            <a:srgbClr val="D5D5D5"/>
-          </a:solidFill>
-          <a:ln w="3175">
-            <a:noFill/>
-          </a:ln>
-          <a:effectLst/>
-        </p:spPr>
-        <p:style>
-          <a:lnRef idx="2">
-            <a:schemeClr val="accent1">
-              <a:shade val="50000"/>
-            </a:schemeClr>
-          </a:lnRef>
-          <a:fillRef idx="1">
-            <a:schemeClr val="accent1"/>
-          </a:fillRef>
-          <a:effectRef idx="0">
-            <a:schemeClr val="accent1"/>
-          </a:effectRef>
-          <a:fontRef idx="minor">
-            <a:schemeClr val="lt1"/>
-          </a:fontRef>
-        </p:style>
-        <p:txBody>
-          <a:bodyPr rtlCol="0" anchor="ctr"/>
-          <a:lstStyle/>
-          <a:p>
-            <a:pPr algn="ctr"/>
-            <a:endParaRPr lang="en-US">
-              <a:solidFill>
-                <a:prstClr val="white"/>
-              </a:solidFill>
-              <a:latin typeface="Calibri" panose="020F0502020204030204"/>
-            </a:endParaRPr>
-          </a:p>
-        </p:txBody>
-      </p:sp>
-      <p:sp>
-        <p:nvSpPr>
-          <p:cNvPr id="12" name="Rectangle 11">
-            <a:extLst>
-              <a:ext uri="{FF2B5EF4-FFF2-40B4-BE49-F238E27FC236}">
-                <a16:creationId xmlns:a16="http://schemas.microsoft.com/office/drawing/2014/main" id="{9DECDBF4-02B6-4BB4-B65B-B8107AD6A9E8}"/>
-              </a:ext>
-              <a:ext uri="{C183D7F6-B498-43B3-948B-1728B52AA6E4}">
-                <adec:decorative xmlns:adec="http://schemas.microsoft.com/office/drawing/2017/decorative" val="1"/>
-              </a:ext>
-            </a:extLst>
-          </p:cNvPr>
-          <p:cNvSpPr>
-            <a:spLocks noGrp="1" noRot="1" noChangeAspect="1" noMove="1" noResize="1" noEditPoints="1" noAdjustHandles="1" noChangeArrowheads="1" noChangeShapeType="1" noTextEdit="1"/>
-          </p:cNvSpPr>
-          <p:nvPr>
-            <p:extLst>
-              <p:ext uri="{386F3935-93C4-4BCD-93E2-E3B085C9AB24}">
-                <p16:designElem xmlns:p16="http://schemas.microsoft.com/office/powerpoint/2015/main" val="1"/>
-              </p:ext>
-            </p:extLst>
-          </p:nvPr>
-        </p:nvSpPr>
-        <p:spPr>
-          <a:xfrm flipV="1">
-            <a:off x="841248" y="2776031"/>
-            <a:ext cx="1873457" cy="137160"/>
-          </a:xfrm>
-          <a:prstGeom prst="rect">
-            <a:avLst/>
-          </a:prstGeom>
-          <a:solidFill>
-            <a:schemeClr val="accent2"/>
-          </a:solidFill>
-          <a:ln>
-            <a:noFill/>
-          </a:ln>
-        </p:spPr>
-        <p:style>
-          <a:lnRef idx="2">
-            <a:schemeClr val="accent1">
-              <a:shade val="50000"/>
-            </a:schemeClr>
-          </a:lnRef>
-          <a:fillRef idx="1">
-            <a:schemeClr val="accent1"/>
-          </a:fillRef>
-          <a:effectRef idx="0">
-            <a:schemeClr val="accent1"/>
-          </a:effectRef>
-          <a:fontRef idx="minor">
-            <a:schemeClr val="lt1"/>
-          </a:fontRef>
-        </p:style>
-        <p:txBody>
-          <a:bodyPr rtlCol="0" anchor="ctr"/>
-          <a:lstStyle/>
-          <a:p>
-            <a:pPr algn="ctr"/>
-            <a:endParaRPr lang="en-US">
-              <a:solidFill>
-                <a:prstClr val="white"/>
-              </a:solidFill>
-              <a:latin typeface="Calibri" panose="020F0502020204030204"/>
-            </a:endParaRPr>
-          </a:p>
-        </p:txBody>
-      </p:sp>
-      <p:sp>
-        <p:nvSpPr>
-          <p:cNvPr id="3" name="Content Placeholder 2">
-            <a:extLst>
-              <a:ext uri="{FF2B5EF4-FFF2-40B4-BE49-F238E27FC236}">
-                <a16:creationId xmlns:a16="http://schemas.microsoft.com/office/drawing/2014/main" id="{13C12766-EACC-3B4C-97F3-25A3382AA16F}"/>
-              </a:ext>
-            </a:extLst>
-          </p:cNvPr>
-          <p:cNvSpPr>
-            <a:spLocks noGrp="1"/>
-          </p:cNvSpPr>
-          <p:nvPr>
-            <p:ph idx="1"/>
-          </p:nvPr>
-        </p:nvSpPr>
-        <p:spPr>
-          <a:xfrm>
-            <a:off x="841248" y="3337269"/>
-            <a:ext cx="10509504" cy="2905686"/>
-          </a:xfrm>
-        </p:spPr>
-        <p:txBody>
-          <a:bodyPr>
-            <a:normAutofit/>
-          </a:bodyPr>
-          <a:lstStyle/>
-          <a:p>
-            <a:pPr marL="0" indent="0">
-              <a:buNone/>
-            </a:pPr>
-            <a:r>
-              <a:rPr lang="en-US" sz="2200"/>
-              <a:t>Additional Value Creation Opportunities</a:t>
-            </a:r>
-          </a:p>
-          <a:p>
-            <a:r>
-              <a:rPr lang="en-US" sz="2200" b="1"/>
-              <a:t>Facility expansion: $1.9M annual profit</a:t>
-            </a:r>
-            <a:r>
-              <a:rPr lang="en-US" sz="2200"/>
-              <a:t> (new run + 150ft vertical + chairlift)</a:t>
-            </a:r>
-          </a:p>
-          <a:p>
-            <a:r>
-              <a:rPr lang="en-US" sz="2200"/>
-              <a:t>125% ROI on infrastructure investment - strong business case</a:t>
-            </a:r>
-          </a:p>
-          <a:p>
-            <a:r>
-              <a:rPr lang="en-US" sz="2200"/>
-              <a:t>Run closures: Minimal revenue impact (1-2 runs) vs. major risk (6+ runs)</a:t>
-            </a:r>
-          </a:p>
-          <a:p>
-            <a:r>
-              <a:rPr lang="en-US" sz="2200"/>
-              <a:t>Snow making/longest run upgrades: No additional pricing power</a:t>
-            </a:r>
-          </a:p>
-        </p:txBody>
-      </p:sp>
-    </p:spTree>
-    <p:extLst>
-      <p:ext uri="{BB962C8B-B14F-4D97-AF65-F5344CB8AC3E}">
-        <p14:creationId xmlns:p14="http://schemas.microsoft.com/office/powerpoint/2010/main" val="4186664615"/>
-      </p:ext>
-    </p:extLst>
-  </p:cSld>
-  <p:clrMapOvr>
-    <a:masterClrMapping/>
-  </p:clrMapOvr>
-</p:sld>
-</file>
-
-<file path=ppt/slides/slide11.xml><?xml version="1.0" encoding="utf-8"?>
-<p:sld xmlns:a="http://schemas.openxmlformats.org/drawingml/2006/main" xmlns:r="http://schemas.openxmlformats.org/officeDocument/2006/relationships" xmlns:p="http://schemas.openxmlformats.org/presentationml/2006/main">
-  <p:cSld>
-    <p:bg>
-      <p:bgPr>
-        <a:solidFill>
-          <a:schemeClr val="bg1"/>
-        </a:solidFill>
-        <a:effectLst/>
-      </p:bgPr>
-    </p:bg>
-    <p:spTree>
-      <p:nvGrpSpPr>
-        <p:cNvPr id="1" name=""/>
-        <p:cNvGrpSpPr/>
-        <p:nvPr/>
-      </p:nvGrpSpPr>
-      <p:grpSpPr>
-        <a:xfrm>
-          <a:off x="0" y="0"/>
-          <a:ext cx="0" cy="0"/>
-          <a:chOff x="0" y="0"/>
-          <a:chExt cx="0" cy="0"/>
-        </a:xfrm>
-      </p:grpSpPr>
-      <p:sp useBgFill="1">
-        <p:nvSpPr>
-          <p:cNvPr id="32" name="Rectangle 31">
-            <a:extLst>
-              <a:ext uri="{FF2B5EF4-FFF2-40B4-BE49-F238E27FC236}">
-                <a16:creationId xmlns:a16="http://schemas.microsoft.com/office/drawing/2014/main" id="{CBB2B1F0-0DD6-4744-9A46-7A344FB48E40}"/>
-              </a:ext>
-              <a:ext uri="{C183D7F6-B498-43B3-948B-1728B52AA6E4}">
-                <adec:decorative xmlns:adec="http://schemas.microsoft.com/office/drawing/2017/decorative" val="1"/>
-              </a:ext>
-            </a:extLst>
-          </p:cNvPr>
-          <p:cNvSpPr>
-            <a:spLocks noGrp="1" noRot="1" noChangeAspect="1" noMove="1" noResize="1" noEditPoints="1" noAdjustHandles="1" noChangeArrowheads="1" noChangeShapeType="1" noTextEdit="1"/>
-          </p:cNvSpPr>
-          <p:nvPr>
-            <p:extLst>
-              <p:ext uri="{386F3935-93C4-4BCD-93E2-E3B085C9AB24}">
-                <p16:designElem xmlns:p16="http://schemas.microsoft.com/office/powerpoint/2015/main" val="1"/>
-              </p:ext>
-            </p:extLst>
-          </p:nvPr>
-        </p:nvSpPr>
-        <p:spPr>
-          <a:xfrm>
-            <a:off x="0" y="0"/>
-            <a:ext cx="12192000" cy="6858000"/>
-          </a:xfrm>
-          <a:prstGeom prst="rect">
-            <a:avLst/>
-          </a:prstGeom>
-          <a:ln>
-            <a:noFill/>
-          </a:ln>
-        </p:spPr>
-        <p:style>
-          <a:lnRef idx="2">
-            <a:schemeClr val="accent1">
-              <a:shade val="50000"/>
-            </a:schemeClr>
-          </a:lnRef>
-          <a:fillRef idx="1">
-            <a:schemeClr val="accent1"/>
-          </a:fillRef>
-          <a:effectRef idx="0">
-            <a:schemeClr val="accent1"/>
-          </a:effectRef>
-          <a:fontRef idx="minor">
-            <a:schemeClr val="lt1"/>
-          </a:fontRef>
-        </p:style>
-        <p:txBody>
-          <a:bodyPr rtlCol="0" anchor="ctr"/>
-          <a:lstStyle/>
-          <a:p>
-            <a:pPr algn="ctr"/>
-            <a:endParaRPr lang="en-US"/>
-          </a:p>
-        </p:txBody>
-      </p:sp>
-      <p:sp>
-        <p:nvSpPr>
-          <p:cNvPr id="2" name="Title 1">
-            <a:extLst>
-              <a:ext uri="{FF2B5EF4-FFF2-40B4-BE49-F238E27FC236}">
-                <a16:creationId xmlns:a16="http://schemas.microsoft.com/office/drawing/2014/main" id="{5E3428A3-D79F-363B-95B9-C1B256D7ACF3}"/>
-              </a:ext>
-            </a:extLst>
-          </p:cNvPr>
-          <p:cNvSpPr>
-            <a:spLocks noGrp="1"/>
-          </p:cNvSpPr>
-          <p:nvPr>
-            <p:ph type="title"/>
-          </p:nvPr>
-        </p:nvSpPr>
-        <p:spPr>
-          <a:xfrm>
-            <a:off x="841248" y="426720"/>
-            <a:ext cx="10506456" cy="1919141"/>
-          </a:xfrm>
-        </p:spPr>
-        <p:txBody>
-          <a:bodyPr vert="horz" lIns="91440" tIns="45720" rIns="91440" bIns="45720" rtlCol="0" anchor="b">
-            <a:normAutofit/>
-          </a:bodyPr>
-          <a:lstStyle/>
-          <a:p>
-            <a:r>
-              <a:rPr lang="en-US" sz="6000" kern="1200">
-                <a:latin typeface="+mj-lt"/>
-                <a:ea typeface="+mj-ea"/>
-                <a:cs typeface="+mj-cs"/>
-              </a:rPr>
-              <a:t>Summary &amp; Conclusion</a:t>
-            </a:r>
-          </a:p>
-        </p:txBody>
-      </p:sp>
-      <p:sp>
-        <p:nvSpPr>
-          <p:cNvPr id="34" name="Rectangle 33">
-            <a:extLst>
-              <a:ext uri="{FF2B5EF4-FFF2-40B4-BE49-F238E27FC236}">
-                <a16:creationId xmlns:a16="http://schemas.microsoft.com/office/drawing/2014/main" id="{52D502E5-F6B4-4D58-B4AE-FC466FF15EE8}"/>
-              </a:ext>
-              <a:ext uri="{C183D7F6-B498-43B3-948B-1728B52AA6E4}">
-                <adec:decorative xmlns:adec="http://schemas.microsoft.com/office/drawing/2017/decorative" val="1"/>
-              </a:ext>
-            </a:extLst>
-          </p:cNvPr>
-          <p:cNvSpPr>
-            <a:spLocks noGrp="1" noRot="1" noChangeAspect="1" noMove="1" noResize="1" noEditPoints="1" noAdjustHandles="1" noChangeArrowheads="1" noChangeShapeType="1" noTextEdit="1"/>
-          </p:cNvSpPr>
-          <p:nvPr>
-            <p:extLst>
-              <p:ext uri="{386F3935-93C4-4BCD-93E2-E3B085C9AB24}">
-                <p16:designElem xmlns:p16="http://schemas.microsoft.com/office/powerpoint/2015/main" val="1"/>
-              </p:ext>
-            </p:extLst>
-          </p:nvPr>
-        </p:nvSpPr>
-        <p:spPr>
-          <a:xfrm>
-            <a:off x="865953" y="2899927"/>
-            <a:ext cx="10451592" cy="18288"/>
-          </a:xfrm>
-          <a:prstGeom prst="rect">
-            <a:avLst/>
-          </a:prstGeom>
-          <a:solidFill>
-            <a:srgbClr val="D5D5D5"/>
-          </a:solidFill>
-          <a:ln w="3175">
-            <a:noFill/>
-          </a:ln>
-          <a:effectLst/>
-        </p:spPr>
-        <p:style>
-          <a:lnRef idx="2">
-            <a:schemeClr val="accent1">
-              <a:shade val="50000"/>
-            </a:schemeClr>
-          </a:lnRef>
-          <a:fillRef idx="1">
-            <a:schemeClr val="accent1"/>
-          </a:fillRef>
-          <a:effectRef idx="0">
-            <a:schemeClr val="accent1"/>
-          </a:effectRef>
-          <a:fontRef idx="minor">
-            <a:schemeClr val="lt1"/>
-          </a:fontRef>
-        </p:style>
-        <p:txBody>
-          <a:bodyPr rtlCol="0" anchor="ctr"/>
-          <a:lstStyle/>
-          <a:p>
-            <a:pPr algn="ctr"/>
-            <a:endParaRPr lang="en-US">
-              <a:solidFill>
-                <a:prstClr val="white"/>
-              </a:solidFill>
-              <a:latin typeface="Calibri" panose="020F0502020204030204"/>
-            </a:endParaRPr>
-          </a:p>
-        </p:txBody>
-      </p:sp>
-      <p:sp>
-        <p:nvSpPr>
-          <p:cNvPr id="36" name="Rectangle 35">
-            <a:extLst>
-              <a:ext uri="{FF2B5EF4-FFF2-40B4-BE49-F238E27FC236}">
-                <a16:creationId xmlns:a16="http://schemas.microsoft.com/office/drawing/2014/main" id="{9DECDBF4-02B6-4BB4-B65B-B8107AD6A9E8}"/>
-              </a:ext>
-              <a:ext uri="{C183D7F6-B498-43B3-948B-1728B52AA6E4}">
-                <adec:decorative xmlns:adec="http://schemas.microsoft.com/office/drawing/2017/decorative" val="1"/>
-              </a:ext>
-            </a:extLst>
-          </p:cNvPr>
-          <p:cNvSpPr>
-            <a:spLocks noGrp="1" noRot="1" noChangeAspect="1" noMove="1" noResize="1" noEditPoints="1" noAdjustHandles="1" noChangeArrowheads="1" noChangeShapeType="1" noTextEdit="1"/>
-          </p:cNvSpPr>
-          <p:nvPr>
-            <p:extLst>
-              <p:ext uri="{386F3935-93C4-4BCD-93E2-E3B085C9AB24}">
-                <p16:designElem xmlns:p16="http://schemas.microsoft.com/office/powerpoint/2015/main" val="1"/>
-              </p:ext>
-            </p:extLst>
-          </p:nvPr>
-        </p:nvSpPr>
-        <p:spPr>
-          <a:xfrm flipV="1">
-            <a:off x="841248" y="2776031"/>
-            <a:ext cx="1873457" cy="137160"/>
-          </a:xfrm>
-          <a:prstGeom prst="rect">
-            <a:avLst/>
-          </a:prstGeom>
-          <a:solidFill>
-            <a:schemeClr val="accent2"/>
-          </a:solidFill>
-          <a:ln>
-            <a:noFill/>
-          </a:ln>
-        </p:spPr>
-        <p:style>
-          <a:lnRef idx="2">
-            <a:schemeClr val="accent1">
-              <a:shade val="50000"/>
-            </a:schemeClr>
-          </a:lnRef>
-          <a:fillRef idx="1">
-            <a:schemeClr val="accent1"/>
-          </a:fillRef>
-          <a:effectRef idx="0">
-            <a:schemeClr val="accent1"/>
-          </a:effectRef>
-          <a:fontRef idx="minor">
-            <a:schemeClr val="lt1"/>
-          </a:fontRef>
-        </p:style>
-        <p:txBody>
-          <a:bodyPr rtlCol="0" anchor="ctr"/>
-          <a:lstStyle/>
-          <a:p>
-            <a:pPr algn="ctr"/>
-            <a:endParaRPr lang="en-US">
-              <a:solidFill>
-                <a:prstClr val="white"/>
-              </a:solidFill>
-              <a:latin typeface="Calibri" panose="020F0502020204030204"/>
-            </a:endParaRPr>
-          </a:p>
-        </p:txBody>
-      </p:sp>
-      <p:sp>
-        <p:nvSpPr>
-          <p:cNvPr id="3" name="Content Placeholder 2">
-            <a:extLst>
-              <a:ext uri="{FF2B5EF4-FFF2-40B4-BE49-F238E27FC236}">
-                <a16:creationId xmlns:a16="http://schemas.microsoft.com/office/drawing/2014/main" id="{E6027010-84B9-BAD4-34E8-105936B75639}"/>
-              </a:ext>
-            </a:extLst>
-          </p:cNvPr>
-          <p:cNvSpPr>
-            <a:spLocks noGrp="1"/>
-          </p:cNvSpPr>
-          <p:nvPr>
-            <p:ph idx="1"/>
-          </p:nvPr>
-        </p:nvSpPr>
-        <p:spPr>
-          <a:xfrm>
-            <a:off x="841248" y="3337269"/>
-            <a:ext cx="10509504" cy="2905686"/>
-          </a:xfrm>
-        </p:spPr>
-        <p:txBody>
-          <a:bodyPr>
-            <a:normAutofit/>
-          </a:bodyPr>
-          <a:lstStyle/>
-          <a:p>
-            <a:pPr marL="0" lvl="0" indent="0">
-              <a:buNone/>
-            </a:pPr>
-            <a:r>
-              <a:rPr lang="en-US" sz="2200"/>
-              <a:t>$27.9M Total Opportunity with Clear Implementation Path</a:t>
-            </a:r>
-          </a:p>
-          <a:p>
-            <a:r>
-              <a:rPr lang="en-US" sz="2200" b="1"/>
-              <a:t>Immediate action: $26M pricing optimization</a:t>
-            </a:r>
-            <a:r>
-              <a:rPr lang="en-US" sz="2200"/>
-              <a:t> ($81 → $95.87 ticket price)</a:t>
-            </a:r>
-          </a:p>
-          <a:p>
-            <a:r>
-              <a:rPr lang="en-US" sz="2200"/>
-              <a:t>Medium-term opportunity: $1.9M facility expansion with 125% ROI</a:t>
-            </a:r>
-          </a:p>
-          <a:p>
-            <a:r>
-              <a:rPr lang="en-US" sz="2200" b="1"/>
-              <a:t>Total potential: $27.9M annual profit increase</a:t>
-            </a:r>
-            <a:r>
-              <a:rPr lang="en-US" sz="2200"/>
-              <a:t> from data-driven strategy</a:t>
-            </a:r>
-          </a:p>
-          <a:p>
-            <a:r>
-              <a:rPr lang="en-US" sz="2200"/>
-              <a:t>Phased implementation: Price testing → demand monitoring → competitor response analysis</a:t>
-            </a:r>
-          </a:p>
-          <a:p>
-            <a:pPr marL="0" lvl="0" indent="0">
-              <a:buNone/>
-            </a:pPr>
-            <a:endParaRPr lang="en-US" sz="2200"/>
-          </a:p>
-        </p:txBody>
-      </p:sp>
-    </p:spTree>
-    <p:extLst>
-      <p:ext uri="{BB962C8B-B14F-4D97-AF65-F5344CB8AC3E}">
-        <p14:creationId xmlns:p14="http://schemas.microsoft.com/office/powerpoint/2010/main" val="3525814671"/>
-      </p:ext>
-    </p:extLst>
-  </p:cSld>
-  <p:clrMapOvr>
-    <a:masterClrMapping/>
-  </p:clrMapOvr>
-  <p:timing>
-    <p:tnLst>
-      <p:par>
-        <p:cTn id="1" dur="indefinite" restart="never" nodeType="tmRoot">
-          <p:childTnLst>
-            <p:seq concurrent="1" nextAc="seek">
-              <p:cTn id="2" dur="indefinite" nodeType="mainSeq">
-                <p:childTnLst>
-                  <p:par>
-                    <p:cTn id="3" fill="hold">
-                      <p:stCondLst>
-                        <p:cond delay="indefinite"/>
-                        <p:cond evt="onBegin" delay="0">
-                          <p:tn val="2"/>
-                        </p:cond>
-                      </p:stCondLst>
-                      <p:childTnLst>
-                        <p:par>
-                          <p:cTn id="4" fill="hold">
-                            <p:stCondLst>
-                              <p:cond delay="0"/>
-                            </p:stCondLst>
-                            <p:childTnLst>
-                              <p:par>
-                                <p:cTn id="5" presetID="10" presetClass="entr" presetSubtype="0" fill="hold" grpId="0" nodeType="withEffect">
-                                  <p:stCondLst>
-                                    <p:cond delay="500"/>
-                                  </p:stCondLst>
-                                  <p:iterate type="lt">
-                                    <p:tmPct val="10000"/>
-                                  </p:iterate>
-                                  <p:childTnLst>
-                                    <p:set>
-                                      <p:cBhvr>
-                                        <p:cTn id="6" dur="1" fill="hold">
-                                          <p:stCondLst>
-                                            <p:cond delay="0"/>
-                                          </p:stCondLst>
-                                        </p:cTn>
-                                        <p:tgtEl>
-                                          <p:spTgt spid="2"/>
-                                        </p:tgtEl>
-                                        <p:attrNameLst>
-                                          <p:attrName>style.visibility</p:attrName>
-                                        </p:attrNameLst>
-                                      </p:cBhvr>
-                                      <p:to>
-                                        <p:strVal val="visible"/>
-                                      </p:to>
-                                    </p:set>
-                                    <p:animEffect transition="in" filter="fade">
-                                      <p:cBhvr>
-                                        <p:cTn id="7" dur="400"/>
-                                        <p:tgtEl>
-                                          <p:spTgt spid="2"/>
-                                        </p:tgtEl>
-                                      </p:cBhvr>
-                                    </p:animEffect>
-                                  </p:childTnLst>
-                                </p:cTn>
-                              </p:par>
-                            </p:childTnLst>
-                          </p:cTn>
-                        </p:par>
-                      </p:childTnLst>
-                    </p:cTn>
-                  </p:par>
-                </p:childTnLst>
-              </p:cTn>
-              <p:prevCondLst>
-                <p:cond evt="onPrev" delay="0">
-                  <p:tgtEl>
-                    <p:sldTgt/>
-                  </p:tgtEl>
-                </p:cond>
-              </p:prevCondLst>
-              <p:nextCondLst>
-                <p:cond evt="onNext" delay="0">
-                  <p:tgtEl>
-                    <p:sldTgt/>
-                  </p:tgtEl>
-                </p:cond>
-              </p:nextCondLst>
-            </p:seq>
-          </p:childTnLst>
-        </p:cTn>
-      </p:par>
-    </p:tnLst>
-    <p:bldLst>
-      <p:bldP spid="2" grpId="0"/>
-    </p:bldLst>
-  </p:timing>
-</p:sld>
-</file>
-
-<file path=ppt/slides/slide2.xml><?xml version="1.0" encoding="utf-8"?>
-<p:sld xmlns:a="http://schemas.openxmlformats.org/drawingml/2006/main" xmlns:r="http://schemas.openxmlformats.org/officeDocument/2006/relationships" xmlns:p="http://schemas.openxmlformats.org/presentationml/2006/main">
-  <p:cSld>
     <p:bg>
       <p:bgPr>
         <a:solidFill>
@@ -6002,7 +5099,449 @@
 </p:sld>
 </file>
 
-<file path=ppt/slides/slide3.xml><?xml version="1.0" encoding="utf-8"?>
+<file path=ppt/slides/slide10.xml><?xml version="1.0" encoding="utf-8"?>
+<p:sld xmlns:a="http://schemas.openxmlformats.org/drawingml/2006/main" xmlns:r="http://schemas.openxmlformats.org/officeDocument/2006/relationships" xmlns:p="http://schemas.openxmlformats.org/presentationml/2006/main">
+  <p:cSld>
+    <p:bg>
+      <p:bgPr>
+        <a:solidFill>
+          <a:schemeClr val="bg1"/>
+        </a:solidFill>
+        <a:effectLst/>
+      </p:bgPr>
+    </p:bg>
+    <p:spTree>
+      <p:nvGrpSpPr>
+        <p:cNvPr id="1" name=""/>
+        <p:cNvGrpSpPr/>
+        <p:nvPr/>
+      </p:nvGrpSpPr>
+      <p:grpSpPr>
+        <a:xfrm>
+          <a:off x="0" y="0"/>
+          <a:ext cx="0" cy="0"/>
+          <a:chOff x="0" y="0"/>
+          <a:chExt cx="0" cy="0"/>
+        </a:xfrm>
+      </p:grpSpPr>
+      <p:sp useBgFill="1">
+        <p:nvSpPr>
+          <p:cNvPr id="32" name="Rectangle 31">
+            <a:extLst>
+              <a:ext uri="{FF2B5EF4-FFF2-40B4-BE49-F238E27FC236}">
+                <a16:creationId xmlns:a16="http://schemas.microsoft.com/office/drawing/2014/main" id="{CBB2B1F0-0DD6-4744-9A46-7A344FB48E40}"/>
+              </a:ext>
+              <a:ext uri="{C183D7F6-B498-43B3-948B-1728B52AA6E4}">
+                <adec:decorative xmlns:adec="http://schemas.microsoft.com/office/drawing/2017/decorative" val="1"/>
+              </a:ext>
+            </a:extLst>
+          </p:cNvPr>
+          <p:cNvSpPr>
+            <a:spLocks noGrp="1" noRot="1" noChangeAspect="1" noMove="1" noResize="1" noEditPoints="1" noAdjustHandles="1" noChangeArrowheads="1" noChangeShapeType="1" noTextEdit="1"/>
+          </p:cNvSpPr>
+          <p:nvPr>
+            <p:extLst>
+              <p:ext uri="{386F3935-93C4-4BCD-93E2-E3B085C9AB24}">
+                <p16:designElem xmlns:p16="http://schemas.microsoft.com/office/powerpoint/2015/main" val="1"/>
+              </p:ext>
+            </p:extLst>
+          </p:nvPr>
+        </p:nvSpPr>
+        <p:spPr>
+          <a:xfrm>
+            <a:off x="0" y="0"/>
+            <a:ext cx="12192000" cy="6858000"/>
+          </a:xfrm>
+          <a:prstGeom prst="rect">
+            <a:avLst/>
+          </a:prstGeom>
+          <a:ln>
+            <a:noFill/>
+          </a:ln>
+        </p:spPr>
+        <p:style>
+          <a:lnRef idx="2">
+            <a:schemeClr val="accent1">
+              <a:shade val="50000"/>
+            </a:schemeClr>
+          </a:lnRef>
+          <a:fillRef idx="1">
+            <a:schemeClr val="accent1"/>
+          </a:fillRef>
+          <a:effectRef idx="0">
+            <a:schemeClr val="accent1"/>
+          </a:effectRef>
+          <a:fontRef idx="minor">
+            <a:schemeClr val="lt1"/>
+          </a:fontRef>
+        </p:style>
+        <p:txBody>
+          <a:bodyPr rtlCol="0" anchor="ctr"/>
+          <a:lstStyle/>
+          <a:p>
+            <a:pPr algn="ctr"/>
+            <a:endParaRPr lang="en-US"/>
+          </a:p>
+        </p:txBody>
+      </p:sp>
+      <p:sp>
+        <p:nvSpPr>
+          <p:cNvPr id="2" name="Title 1">
+            <a:extLst>
+              <a:ext uri="{FF2B5EF4-FFF2-40B4-BE49-F238E27FC236}">
+                <a16:creationId xmlns:a16="http://schemas.microsoft.com/office/drawing/2014/main" id="{5E3428A3-D79F-363B-95B9-C1B256D7ACF3}"/>
+              </a:ext>
+            </a:extLst>
+          </p:cNvPr>
+          <p:cNvSpPr>
+            <a:spLocks noGrp="1"/>
+          </p:cNvSpPr>
+          <p:nvPr>
+            <p:ph type="title"/>
+          </p:nvPr>
+        </p:nvSpPr>
+        <p:spPr>
+          <a:xfrm>
+            <a:off x="841248" y="426720"/>
+            <a:ext cx="10506456" cy="1919141"/>
+          </a:xfrm>
+        </p:spPr>
+        <p:txBody>
+          <a:bodyPr vert="horz" lIns="91440" tIns="45720" rIns="91440" bIns="45720" rtlCol="0" anchor="b">
+            <a:normAutofit/>
+          </a:bodyPr>
+          <a:lstStyle/>
+          <a:p>
+            <a:r>
+              <a:rPr lang="en-US" sz="6000" kern="1200">
+                <a:latin typeface="+mj-lt"/>
+                <a:ea typeface="+mj-ea"/>
+                <a:cs typeface="+mj-cs"/>
+              </a:rPr>
+              <a:t>Summary &amp; Conclusion</a:t>
+            </a:r>
+          </a:p>
+        </p:txBody>
+      </p:sp>
+      <p:sp>
+        <p:nvSpPr>
+          <p:cNvPr id="34" name="Rectangle 33">
+            <a:extLst>
+              <a:ext uri="{FF2B5EF4-FFF2-40B4-BE49-F238E27FC236}">
+                <a16:creationId xmlns:a16="http://schemas.microsoft.com/office/drawing/2014/main" id="{52D502E5-F6B4-4D58-B4AE-FC466FF15EE8}"/>
+              </a:ext>
+              <a:ext uri="{C183D7F6-B498-43B3-948B-1728B52AA6E4}">
+                <adec:decorative xmlns:adec="http://schemas.microsoft.com/office/drawing/2017/decorative" val="1"/>
+              </a:ext>
+            </a:extLst>
+          </p:cNvPr>
+          <p:cNvSpPr>
+            <a:spLocks noGrp="1" noRot="1" noChangeAspect="1" noMove="1" noResize="1" noEditPoints="1" noAdjustHandles="1" noChangeArrowheads="1" noChangeShapeType="1" noTextEdit="1"/>
+          </p:cNvSpPr>
+          <p:nvPr>
+            <p:extLst>
+              <p:ext uri="{386F3935-93C4-4BCD-93E2-E3B085C9AB24}">
+                <p16:designElem xmlns:p16="http://schemas.microsoft.com/office/powerpoint/2015/main" val="1"/>
+              </p:ext>
+            </p:extLst>
+          </p:nvPr>
+        </p:nvSpPr>
+        <p:spPr>
+          <a:xfrm>
+            <a:off x="865953" y="2899927"/>
+            <a:ext cx="10451592" cy="18288"/>
+          </a:xfrm>
+          <a:prstGeom prst="rect">
+            <a:avLst/>
+          </a:prstGeom>
+          <a:solidFill>
+            <a:srgbClr val="D5D5D5"/>
+          </a:solidFill>
+          <a:ln w="3175">
+            <a:noFill/>
+          </a:ln>
+          <a:effectLst/>
+        </p:spPr>
+        <p:style>
+          <a:lnRef idx="2">
+            <a:schemeClr val="accent1">
+              <a:shade val="50000"/>
+            </a:schemeClr>
+          </a:lnRef>
+          <a:fillRef idx="1">
+            <a:schemeClr val="accent1"/>
+          </a:fillRef>
+          <a:effectRef idx="0">
+            <a:schemeClr val="accent1"/>
+          </a:effectRef>
+          <a:fontRef idx="minor">
+            <a:schemeClr val="lt1"/>
+          </a:fontRef>
+        </p:style>
+        <p:txBody>
+          <a:bodyPr rtlCol="0" anchor="ctr"/>
+          <a:lstStyle/>
+          <a:p>
+            <a:pPr algn="ctr"/>
+            <a:endParaRPr lang="en-US">
+              <a:solidFill>
+                <a:prstClr val="white"/>
+              </a:solidFill>
+              <a:latin typeface="Calibri" panose="020F0502020204030204"/>
+            </a:endParaRPr>
+          </a:p>
+        </p:txBody>
+      </p:sp>
+      <p:sp>
+        <p:nvSpPr>
+          <p:cNvPr id="36" name="Rectangle 35">
+            <a:extLst>
+              <a:ext uri="{FF2B5EF4-FFF2-40B4-BE49-F238E27FC236}">
+                <a16:creationId xmlns:a16="http://schemas.microsoft.com/office/drawing/2014/main" id="{9DECDBF4-02B6-4BB4-B65B-B8107AD6A9E8}"/>
+              </a:ext>
+              <a:ext uri="{C183D7F6-B498-43B3-948B-1728B52AA6E4}">
+                <adec:decorative xmlns:adec="http://schemas.microsoft.com/office/drawing/2017/decorative" val="1"/>
+              </a:ext>
+            </a:extLst>
+          </p:cNvPr>
+          <p:cNvSpPr>
+            <a:spLocks noGrp="1" noRot="1" noChangeAspect="1" noMove="1" noResize="1" noEditPoints="1" noAdjustHandles="1" noChangeArrowheads="1" noChangeShapeType="1" noTextEdit="1"/>
+          </p:cNvSpPr>
+          <p:nvPr>
+            <p:extLst>
+              <p:ext uri="{386F3935-93C4-4BCD-93E2-E3B085C9AB24}">
+                <p16:designElem xmlns:p16="http://schemas.microsoft.com/office/powerpoint/2015/main" val="1"/>
+              </p:ext>
+            </p:extLst>
+          </p:nvPr>
+        </p:nvSpPr>
+        <p:spPr>
+          <a:xfrm flipV="1">
+            <a:off x="841248" y="2776031"/>
+            <a:ext cx="1873457" cy="137160"/>
+          </a:xfrm>
+          <a:prstGeom prst="rect">
+            <a:avLst/>
+          </a:prstGeom>
+          <a:solidFill>
+            <a:schemeClr val="accent2"/>
+          </a:solidFill>
+          <a:ln>
+            <a:noFill/>
+          </a:ln>
+        </p:spPr>
+        <p:style>
+          <a:lnRef idx="2">
+            <a:schemeClr val="accent1">
+              <a:shade val="50000"/>
+            </a:schemeClr>
+          </a:lnRef>
+          <a:fillRef idx="1">
+            <a:schemeClr val="accent1"/>
+          </a:fillRef>
+          <a:effectRef idx="0">
+            <a:schemeClr val="accent1"/>
+          </a:effectRef>
+          <a:fontRef idx="minor">
+            <a:schemeClr val="lt1"/>
+          </a:fontRef>
+        </p:style>
+        <p:txBody>
+          <a:bodyPr rtlCol="0" anchor="ctr"/>
+          <a:lstStyle/>
+          <a:p>
+            <a:pPr algn="ctr"/>
+            <a:endParaRPr lang="en-US">
+              <a:solidFill>
+                <a:prstClr val="white"/>
+              </a:solidFill>
+              <a:latin typeface="Calibri" panose="020F0502020204030204"/>
+            </a:endParaRPr>
+          </a:p>
+        </p:txBody>
+      </p:sp>
+      <p:sp>
+        <p:nvSpPr>
+          <p:cNvPr id="3" name="Content Placeholder 2">
+            <a:extLst>
+              <a:ext uri="{FF2B5EF4-FFF2-40B4-BE49-F238E27FC236}">
+                <a16:creationId xmlns:a16="http://schemas.microsoft.com/office/drawing/2014/main" id="{E6027010-84B9-BAD4-34E8-105936B75639}"/>
+              </a:ext>
+            </a:extLst>
+          </p:cNvPr>
+          <p:cNvSpPr>
+            <a:spLocks noGrp="1"/>
+          </p:cNvSpPr>
+          <p:nvPr>
+            <p:ph idx="1"/>
+          </p:nvPr>
+        </p:nvSpPr>
+        <p:spPr>
+          <a:xfrm>
+            <a:off x="841248" y="3337269"/>
+            <a:ext cx="10509504" cy="2905686"/>
+          </a:xfrm>
+        </p:spPr>
+        <p:txBody>
+          <a:bodyPr>
+            <a:normAutofit/>
+          </a:bodyPr>
+          <a:lstStyle/>
+          <a:p>
+            <a:pPr marL="0" lvl="0" indent="0">
+              <a:buNone/>
+            </a:pPr>
+            <a:r>
+              <a:rPr lang="en-US" sz="2200"/>
+              <a:t>$27.9M Total Opportunity with Clear Implementation Path</a:t>
+            </a:r>
+          </a:p>
+          <a:p>
+            <a:r>
+              <a:rPr lang="en-US" sz="2200" b="1"/>
+              <a:t>Immediate action: $26M pricing optimization</a:t>
+            </a:r>
+            <a:r>
+              <a:rPr lang="en-US" sz="2200"/>
+              <a:t> ($81 → $95.87 ticket price)</a:t>
+            </a:r>
+          </a:p>
+          <a:p>
+            <a:r>
+              <a:rPr lang="en-US" sz="2200"/>
+              <a:t>Medium-term opportunity: $1.9M facility expansion with 125% ROI</a:t>
+            </a:r>
+          </a:p>
+          <a:p>
+            <a:r>
+              <a:rPr lang="en-US" sz="2200" b="1"/>
+              <a:t>Total potential: $27.9M annual profit increase</a:t>
+            </a:r>
+            <a:r>
+              <a:rPr lang="en-US" sz="2200"/>
+              <a:t> from data-driven strategy</a:t>
+            </a:r>
+          </a:p>
+          <a:p>
+            <a:r>
+              <a:rPr lang="en-US" sz="2200"/>
+              <a:t>Phased implementation: Price testing → demand monitoring → competitor response analysis</a:t>
+            </a:r>
+          </a:p>
+          <a:p>
+            <a:pPr marL="0" lvl="0" indent="0">
+              <a:buNone/>
+            </a:pPr>
+            <a:endParaRPr lang="en-US" sz="2200"/>
+          </a:p>
+        </p:txBody>
+      </p:sp>
+    </p:spTree>
+    <p:extLst>
+      <p:ext uri="{BB962C8B-B14F-4D97-AF65-F5344CB8AC3E}">
+        <p14:creationId xmlns:p14="http://schemas.microsoft.com/office/powerpoint/2010/main" val="3525814671"/>
+      </p:ext>
+    </p:extLst>
+  </p:cSld>
+  <p:clrMapOvr>
+    <a:masterClrMapping/>
+  </p:clrMapOvr>
+  <p:timing>
+    <p:tnLst>
+      <p:par>
+        <p:cTn id="1" dur="indefinite" restart="never" nodeType="tmRoot">
+          <p:childTnLst>
+            <p:seq concurrent="1" nextAc="seek">
+              <p:cTn id="2" dur="indefinite" nodeType="mainSeq">
+                <p:childTnLst>
+                  <p:par>
+                    <p:cTn id="3" fill="hold">
+                      <p:stCondLst>
+                        <p:cond delay="indefinite"/>
+                        <p:cond evt="onBegin" delay="0">
+                          <p:tn val="2"/>
+                        </p:cond>
+                      </p:stCondLst>
+                      <p:childTnLst>
+                        <p:par>
+                          <p:cTn id="4" fill="hold">
+                            <p:stCondLst>
+                              <p:cond delay="0"/>
+                            </p:stCondLst>
+                            <p:childTnLst>
+                              <p:par>
+                                <p:cTn id="5" presetID="10" presetClass="entr" presetSubtype="0" fill="hold" grpId="0" nodeType="withEffect">
+                                  <p:stCondLst>
+                                    <p:cond delay="500"/>
+                                  </p:stCondLst>
+                                  <p:iterate type="lt">
+                                    <p:tmPct val="10000"/>
+                                  </p:iterate>
+                                  <p:childTnLst>
+                                    <p:set>
+                                      <p:cBhvr>
+                                        <p:cTn id="6" dur="1" fill="hold">
+                                          <p:stCondLst>
+                                            <p:cond delay="0"/>
+                                          </p:stCondLst>
+                                        </p:cTn>
+                                        <p:tgtEl>
+                                          <p:spTgt spid="2"/>
+                                        </p:tgtEl>
+                                        <p:attrNameLst>
+                                          <p:attrName>style.visibility</p:attrName>
+                                        </p:attrNameLst>
+                                      </p:cBhvr>
+                                      <p:to>
+                                        <p:strVal val="visible"/>
+                                      </p:to>
+                                    </p:set>
+                                    <p:animEffect transition="in" filter="fade">
+                                      <p:cBhvr>
+                                        <p:cTn id="7" dur="400"/>
+                                        <p:tgtEl>
+                                          <p:spTgt spid="2"/>
+                                        </p:tgtEl>
+                                      </p:cBhvr>
+                                    </p:animEffect>
+                                  </p:childTnLst>
+                                </p:cTn>
+                              </p:par>
+                            </p:childTnLst>
+                          </p:cTn>
+                        </p:par>
+                      </p:childTnLst>
+                    </p:cTn>
+                  </p:par>
+                </p:childTnLst>
+              </p:cTn>
+              <p:prevCondLst>
+                <p:cond evt="onPrev" delay="0">
+                  <p:tgtEl>
+                    <p:sldTgt/>
+                  </p:tgtEl>
+                </p:cond>
+              </p:prevCondLst>
+              <p:nextCondLst>
+                <p:cond evt="onNext" delay="0">
+                  <p:tgtEl>
+                    <p:sldTgt/>
+                  </p:tgtEl>
+                </p:cond>
+              </p:nextCondLst>
+            </p:seq>
+          </p:childTnLst>
+        </p:cTn>
+      </p:par>
+    </p:tnLst>
+    <p:bldLst>
+      <p:bldP spid="2" grpId="0"/>
+    </p:bldLst>
+  </p:timing>
+</p:sld>
+</file>
+
+<file path=ppt/slides/slide2.xml><?xml version="1.0" encoding="utf-8"?>
 <p:sld xmlns:a="http://schemas.openxmlformats.org/drawingml/2006/main" xmlns:r="http://schemas.openxmlformats.org/officeDocument/2006/relationships" xmlns:p="http://schemas.openxmlformats.org/presentationml/2006/main">
   <p:cSld>
     <p:bg>
@@ -6309,7 +5848,7 @@
 </p:sld>
 </file>
 
-<file path=ppt/slides/slide4.xml><?xml version="1.0" encoding="utf-8"?>
+<file path=ppt/slides/slide3.xml><?xml version="1.0" encoding="utf-8"?>
 <p:sld xmlns:a="http://schemas.openxmlformats.org/drawingml/2006/main" xmlns:r="http://schemas.openxmlformats.org/officeDocument/2006/relationships" xmlns:p="http://schemas.openxmlformats.org/presentationml/2006/main">
   <p:cSld>
     <p:spTree>
@@ -6476,7 +6015,7 @@
 </p:sld>
 </file>
 
-<file path=ppt/slides/slide5.xml><?xml version="1.0" encoding="utf-8"?>
+<file path=ppt/slides/slide4.xml><?xml version="1.0" encoding="utf-8"?>
 <p:sld xmlns:a="http://schemas.openxmlformats.org/drawingml/2006/main" xmlns:r="http://schemas.openxmlformats.org/officeDocument/2006/relationships" xmlns:p="http://schemas.openxmlformats.org/presentationml/2006/main">
   <p:cSld>
     <p:bg>
@@ -6957,7 +6496,7 @@
 </p:sld>
 </file>
 
-<file path=ppt/slides/slide6.xml><?xml version="1.0" encoding="utf-8"?>
+<file path=ppt/slides/slide5.xml><?xml version="1.0" encoding="utf-8"?>
 <p:sld xmlns:a="http://schemas.openxmlformats.org/drawingml/2006/main" xmlns:r="http://schemas.openxmlformats.org/officeDocument/2006/relationships" xmlns:p="http://schemas.openxmlformats.org/presentationml/2006/main">
   <p:cSld>
     <p:bg>
@@ -7430,7 +6969,7 @@
 </p:sld>
 </file>
 
-<file path=ppt/slides/slide7.xml><?xml version="1.0" encoding="utf-8"?>
+<file path=ppt/slides/slide6.xml><?xml version="1.0" encoding="utf-8"?>
 <p:sld xmlns:a="http://schemas.openxmlformats.org/drawingml/2006/main" xmlns:r="http://schemas.openxmlformats.org/officeDocument/2006/relationships" xmlns:p="http://schemas.openxmlformats.org/presentationml/2006/main">
   <p:cSld>
     <p:bg>
@@ -7739,7 +7278,7 @@
 </p:sld>
 </file>
 
-<file path=ppt/slides/slide8.xml><?xml version="1.0" encoding="utf-8"?>
+<file path=ppt/slides/slide7.xml><?xml version="1.0" encoding="utf-8"?>
 <p:sld xmlns:a="http://schemas.openxmlformats.org/drawingml/2006/main" xmlns:r="http://schemas.openxmlformats.org/officeDocument/2006/relationships" xmlns:p="http://schemas.openxmlformats.org/presentationml/2006/main">
   <p:cSld>
     <p:bg>
@@ -8200,7 +7739,7 @@
 </p:sld>
 </file>
 
-<file path=ppt/slides/slide9.xml><?xml version="1.0" encoding="utf-8"?>
+<file path=ppt/slides/slide8.xml><?xml version="1.0" encoding="utf-8"?>
 <p:sld xmlns:a="http://schemas.openxmlformats.org/drawingml/2006/main" xmlns:r="http://schemas.openxmlformats.org/officeDocument/2006/relationships" xmlns:p="http://schemas.openxmlformats.org/presentationml/2006/main">
   <p:cSld>
     <p:bg>
@@ -8673,6 +8212,342 @@
     <p:extLst>
       <p:ext uri="{BB962C8B-B14F-4D97-AF65-F5344CB8AC3E}">
         <p14:creationId xmlns:p14="http://schemas.microsoft.com/office/powerpoint/2010/main" val="873114695"/>
+      </p:ext>
+    </p:extLst>
+  </p:cSld>
+  <p:clrMapOvr>
+    <a:masterClrMapping/>
+  </p:clrMapOvr>
+</p:sld>
+</file>
+
+<file path=ppt/slides/slide9.xml><?xml version="1.0" encoding="utf-8"?>
+<p:sld xmlns:a="http://schemas.openxmlformats.org/drawingml/2006/main" xmlns:r="http://schemas.openxmlformats.org/officeDocument/2006/relationships" xmlns:p="http://schemas.openxmlformats.org/presentationml/2006/main">
+  <p:cSld>
+    <p:bg>
+      <p:bgPr>
+        <a:solidFill>
+          <a:schemeClr val="bg1"/>
+        </a:solidFill>
+        <a:effectLst/>
+      </p:bgPr>
+    </p:bg>
+    <p:spTree>
+      <p:nvGrpSpPr>
+        <p:cNvPr id="1" name=""/>
+        <p:cNvGrpSpPr/>
+        <p:nvPr/>
+      </p:nvGrpSpPr>
+      <p:grpSpPr>
+        <a:xfrm>
+          <a:off x="0" y="0"/>
+          <a:ext cx="0" cy="0"/>
+          <a:chOff x="0" y="0"/>
+          <a:chExt cx="0" cy="0"/>
+        </a:xfrm>
+      </p:grpSpPr>
+      <p:sp useBgFill="1">
+        <p:nvSpPr>
+          <p:cNvPr id="8" name="Rectangle 7">
+            <a:extLst>
+              <a:ext uri="{FF2B5EF4-FFF2-40B4-BE49-F238E27FC236}">
+                <a16:creationId xmlns:a16="http://schemas.microsoft.com/office/drawing/2014/main" id="{CBB2B1F0-0DD6-4744-9A46-7A344FB48E40}"/>
+              </a:ext>
+              <a:ext uri="{C183D7F6-B498-43B3-948B-1728B52AA6E4}">
+                <adec:decorative xmlns:adec="http://schemas.microsoft.com/office/drawing/2017/decorative" val="1"/>
+              </a:ext>
+            </a:extLst>
+          </p:cNvPr>
+          <p:cNvSpPr>
+            <a:spLocks noGrp="1" noRot="1" noChangeAspect="1" noMove="1" noResize="1" noEditPoints="1" noAdjustHandles="1" noChangeArrowheads="1" noChangeShapeType="1" noTextEdit="1"/>
+          </p:cNvSpPr>
+          <p:nvPr>
+            <p:extLst>
+              <p:ext uri="{386F3935-93C4-4BCD-93E2-E3B085C9AB24}">
+                <p16:designElem xmlns:p16="http://schemas.microsoft.com/office/powerpoint/2015/main" val="1"/>
+              </p:ext>
+            </p:extLst>
+          </p:nvPr>
+        </p:nvSpPr>
+        <p:spPr>
+          <a:xfrm>
+            <a:off x="0" y="0"/>
+            <a:ext cx="12192000" cy="6858000"/>
+          </a:xfrm>
+          <a:prstGeom prst="rect">
+            <a:avLst/>
+          </a:prstGeom>
+          <a:ln>
+            <a:noFill/>
+          </a:ln>
+        </p:spPr>
+        <p:style>
+          <a:lnRef idx="2">
+            <a:schemeClr val="accent1">
+              <a:shade val="50000"/>
+            </a:schemeClr>
+          </a:lnRef>
+          <a:fillRef idx="1">
+            <a:schemeClr val="accent1"/>
+          </a:fillRef>
+          <a:effectRef idx="0">
+            <a:schemeClr val="accent1"/>
+          </a:effectRef>
+          <a:fontRef idx="minor">
+            <a:schemeClr val="lt1"/>
+          </a:fontRef>
+        </p:style>
+        <p:txBody>
+          <a:bodyPr rtlCol="0" anchor="ctr"/>
+          <a:lstStyle/>
+          <a:p>
+            <a:pPr algn="ctr"/>
+            <a:endParaRPr lang="en-US"/>
+          </a:p>
+        </p:txBody>
+      </p:sp>
+      <p:sp>
+        <p:nvSpPr>
+          <p:cNvPr id="2" name="Title 1">
+            <a:extLst>
+              <a:ext uri="{FF2B5EF4-FFF2-40B4-BE49-F238E27FC236}">
+                <a16:creationId xmlns:a16="http://schemas.microsoft.com/office/drawing/2014/main" id="{6B69D532-3C23-B60D-9293-4D73396CC424}"/>
+              </a:ext>
+            </a:extLst>
+          </p:cNvPr>
+          <p:cNvSpPr>
+            <a:spLocks noGrp="1"/>
+          </p:cNvSpPr>
+          <p:nvPr>
+            <p:ph type="title"/>
+          </p:nvPr>
+        </p:nvSpPr>
+        <p:spPr>
+          <a:xfrm>
+            <a:off x="841248" y="426720"/>
+            <a:ext cx="10506456" cy="1919141"/>
+          </a:xfrm>
+        </p:spPr>
+        <p:txBody>
+          <a:bodyPr anchor="b">
+            <a:normAutofit/>
+          </a:bodyPr>
+          <a:lstStyle/>
+          <a:p>
+            <a:r>
+              <a:rPr lang="en-US" sz="6000"/>
+              <a:t>Facility Investment Scenarios</a:t>
+            </a:r>
+          </a:p>
+        </p:txBody>
+      </p:sp>
+      <p:sp>
+        <p:nvSpPr>
+          <p:cNvPr id="10" name="Rectangle 9">
+            <a:extLst>
+              <a:ext uri="{FF2B5EF4-FFF2-40B4-BE49-F238E27FC236}">
+                <a16:creationId xmlns:a16="http://schemas.microsoft.com/office/drawing/2014/main" id="{52D502E5-F6B4-4D58-B4AE-FC466FF15EE8}"/>
+              </a:ext>
+              <a:ext uri="{C183D7F6-B498-43B3-948B-1728B52AA6E4}">
+                <adec:decorative xmlns:adec="http://schemas.microsoft.com/office/drawing/2017/decorative" val="1"/>
+              </a:ext>
+            </a:extLst>
+          </p:cNvPr>
+          <p:cNvSpPr>
+            <a:spLocks noGrp="1" noRot="1" noChangeAspect="1" noMove="1" noResize="1" noEditPoints="1" noAdjustHandles="1" noChangeArrowheads="1" noChangeShapeType="1" noTextEdit="1"/>
+          </p:cNvSpPr>
+          <p:nvPr>
+            <p:extLst>
+              <p:ext uri="{386F3935-93C4-4BCD-93E2-E3B085C9AB24}">
+                <p16:designElem xmlns:p16="http://schemas.microsoft.com/office/powerpoint/2015/main" val="1"/>
+              </p:ext>
+            </p:extLst>
+          </p:nvPr>
+        </p:nvSpPr>
+        <p:spPr>
+          <a:xfrm>
+            <a:off x="865953" y="2899927"/>
+            <a:ext cx="10451592" cy="18288"/>
+          </a:xfrm>
+          <a:prstGeom prst="rect">
+            <a:avLst/>
+          </a:prstGeom>
+          <a:solidFill>
+            <a:srgbClr val="D5D5D5"/>
+          </a:solidFill>
+          <a:ln w="3175">
+            <a:noFill/>
+          </a:ln>
+          <a:effectLst/>
+        </p:spPr>
+        <p:style>
+          <a:lnRef idx="2">
+            <a:schemeClr val="accent1">
+              <a:shade val="50000"/>
+            </a:schemeClr>
+          </a:lnRef>
+          <a:fillRef idx="1">
+            <a:schemeClr val="accent1"/>
+          </a:fillRef>
+          <a:effectRef idx="0">
+            <a:schemeClr val="accent1"/>
+          </a:effectRef>
+          <a:fontRef idx="minor">
+            <a:schemeClr val="lt1"/>
+          </a:fontRef>
+        </p:style>
+        <p:txBody>
+          <a:bodyPr rtlCol="0" anchor="ctr"/>
+          <a:lstStyle/>
+          <a:p>
+            <a:pPr algn="ctr"/>
+            <a:endParaRPr lang="en-US">
+              <a:solidFill>
+                <a:prstClr val="white"/>
+              </a:solidFill>
+              <a:latin typeface="Calibri" panose="020F0502020204030204"/>
+            </a:endParaRPr>
+          </a:p>
+        </p:txBody>
+      </p:sp>
+      <p:sp>
+        <p:nvSpPr>
+          <p:cNvPr id="12" name="Rectangle 11">
+            <a:extLst>
+              <a:ext uri="{FF2B5EF4-FFF2-40B4-BE49-F238E27FC236}">
+                <a16:creationId xmlns:a16="http://schemas.microsoft.com/office/drawing/2014/main" id="{9DECDBF4-02B6-4BB4-B65B-B8107AD6A9E8}"/>
+              </a:ext>
+              <a:ext uri="{C183D7F6-B498-43B3-948B-1728B52AA6E4}">
+                <adec:decorative xmlns:adec="http://schemas.microsoft.com/office/drawing/2017/decorative" val="1"/>
+              </a:ext>
+            </a:extLst>
+          </p:cNvPr>
+          <p:cNvSpPr>
+            <a:spLocks noGrp="1" noRot="1" noChangeAspect="1" noMove="1" noResize="1" noEditPoints="1" noAdjustHandles="1" noChangeArrowheads="1" noChangeShapeType="1" noTextEdit="1"/>
+          </p:cNvSpPr>
+          <p:nvPr>
+            <p:extLst>
+              <p:ext uri="{386F3935-93C4-4BCD-93E2-E3B085C9AB24}">
+                <p16:designElem xmlns:p16="http://schemas.microsoft.com/office/powerpoint/2015/main" val="1"/>
+              </p:ext>
+            </p:extLst>
+          </p:nvPr>
+        </p:nvSpPr>
+        <p:spPr>
+          <a:xfrm flipV="1">
+            <a:off x="841248" y="2776031"/>
+            <a:ext cx="1873457" cy="137160"/>
+          </a:xfrm>
+          <a:prstGeom prst="rect">
+            <a:avLst/>
+          </a:prstGeom>
+          <a:solidFill>
+            <a:schemeClr val="accent2"/>
+          </a:solidFill>
+          <a:ln>
+            <a:noFill/>
+          </a:ln>
+        </p:spPr>
+        <p:style>
+          <a:lnRef idx="2">
+            <a:schemeClr val="accent1">
+              <a:shade val="50000"/>
+            </a:schemeClr>
+          </a:lnRef>
+          <a:fillRef idx="1">
+            <a:schemeClr val="accent1"/>
+          </a:fillRef>
+          <a:effectRef idx="0">
+            <a:schemeClr val="accent1"/>
+          </a:effectRef>
+          <a:fontRef idx="minor">
+            <a:schemeClr val="lt1"/>
+          </a:fontRef>
+        </p:style>
+        <p:txBody>
+          <a:bodyPr rtlCol="0" anchor="ctr"/>
+          <a:lstStyle/>
+          <a:p>
+            <a:pPr algn="ctr"/>
+            <a:endParaRPr lang="en-US">
+              <a:solidFill>
+                <a:prstClr val="white"/>
+              </a:solidFill>
+              <a:latin typeface="Calibri" panose="020F0502020204030204"/>
+            </a:endParaRPr>
+          </a:p>
+        </p:txBody>
+      </p:sp>
+      <p:sp>
+        <p:nvSpPr>
+          <p:cNvPr id="3" name="Content Placeholder 2">
+            <a:extLst>
+              <a:ext uri="{FF2B5EF4-FFF2-40B4-BE49-F238E27FC236}">
+                <a16:creationId xmlns:a16="http://schemas.microsoft.com/office/drawing/2014/main" id="{13C12766-EACC-3B4C-97F3-25A3382AA16F}"/>
+              </a:ext>
+            </a:extLst>
+          </p:cNvPr>
+          <p:cNvSpPr>
+            <a:spLocks noGrp="1"/>
+          </p:cNvSpPr>
+          <p:nvPr>
+            <p:ph idx="1"/>
+          </p:nvPr>
+        </p:nvSpPr>
+        <p:spPr>
+          <a:xfrm>
+            <a:off x="841248" y="3337269"/>
+            <a:ext cx="10509504" cy="2905686"/>
+          </a:xfrm>
+        </p:spPr>
+        <p:txBody>
+          <a:bodyPr>
+            <a:normAutofit/>
+          </a:bodyPr>
+          <a:lstStyle/>
+          <a:p>
+            <a:pPr marL="0" indent="0">
+              <a:buNone/>
+            </a:pPr>
+            <a:r>
+              <a:rPr lang="en-US" sz="2200"/>
+              <a:t>Additional Value Creation Opportunities</a:t>
+            </a:r>
+          </a:p>
+          <a:p>
+            <a:r>
+              <a:rPr lang="en-US" sz="2200" b="1"/>
+              <a:t>Facility expansion: $1.9M annual profit</a:t>
+            </a:r>
+            <a:r>
+              <a:rPr lang="en-US" sz="2200"/>
+              <a:t> (new run + 150ft vertical + chairlift)</a:t>
+            </a:r>
+          </a:p>
+          <a:p>
+            <a:r>
+              <a:rPr lang="en-US" sz="2200"/>
+              <a:t>125% ROI on infrastructure investment - strong business case</a:t>
+            </a:r>
+          </a:p>
+          <a:p>
+            <a:r>
+              <a:rPr lang="en-US" sz="2200"/>
+              <a:t>Run closures: Minimal revenue impact (1-2 runs) vs. major risk (6+ runs)</a:t>
+            </a:r>
+          </a:p>
+          <a:p>
+            <a:r>
+              <a:rPr lang="en-US" sz="2200"/>
+              <a:t>Snow making/longest run upgrades: No additional pricing power</a:t>
+            </a:r>
+          </a:p>
+        </p:txBody>
+      </p:sp>
+    </p:spTree>
+    <p:extLst>
+      <p:ext uri="{BB962C8B-B14F-4D97-AF65-F5344CB8AC3E}">
+        <p14:creationId xmlns:p14="http://schemas.microsoft.com/office/powerpoint/2010/main" val="4186664615"/>
       </p:ext>
     </p:extLst>
   </p:cSld>

</xml_diff>